<commit_message>
Fixed wierd bullet point issue
</commit_message>
<xml_diff>
--- a/Emerging-Technologies-for-the-Circular-Economy/ETCE-L05a-IoT-Communications.pptx
+++ b/Emerging-Technologies-for-the-Circular-Economy/ETCE-L05a-IoT-Communications.pptx
@@ -4642,7 +4642,7 @@
         <p:spPr>
           <a:xfrm>
             <a:off x="11444760" y="0"/>
-            <a:ext cx="743400" cy="6852240"/>
+            <a:ext cx="743040" cy="6851880"/>
           </a:xfrm>
           <a:prstGeom prst="rect">
             <a:avLst/>
@@ -4672,7 +4672,7 @@
         <p:spPr>
           <a:xfrm>
             <a:off x="11438640" y="6453360"/>
-            <a:ext cx="760320" cy="363960"/>
+            <a:ext cx="759960" cy="363960"/>
           </a:xfrm>
           <a:prstGeom prst="rect">
             <a:avLst/>
@@ -4702,7 +4702,7 @@
                 <a:tab algn="l" pos="408240"/>
               </a:tabLst>
             </a:pPr>
-            <a:fld id="{05CC4F8D-10CB-4AE5-90FA-E4A400180AD7}" type="slidenum">
+            <a:fld id="{8F47D7AF-F92A-454D-B520-DC9D5FC753A5}" type="slidenum">
               <a:rPr b="0" lang="en-US" sz="1800" spc="-1" strike="noStrike">
                 <a:solidFill>
                   <a:srgbClr val="808080"/>
@@ -4727,7 +4727,7 @@
         <p:spPr>
           <a:xfrm>
             <a:off x="912240" y="1268280"/>
-            <a:ext cx="9210240" cy="363600"/>
+            <a:ext cx="9209880" cy="363240"/>
           </a:xfrm>
           <a:prstGeom prst="rect">
             <a:avLst/>
@@ -4757,7 +4757,7 @@
         <p:spPr>
           <a:xfrm>
             <a:off x="0" y="0"/>
-            <a:ext cx="3054240" cy="564120"/>
+            <a:ext cx="3053880" cy="563760"/>
           </a:xfrm>
           <a:prstGeom prst="rect">
             <a:avLst/>
@@ -4780,7 +4780,7 @@
         <p:spPr>
           <a:xfrm>
             <a:off x="7430400" y="134640"/>
-            <a:ext cx="3700080" cy="516240"/>
+            <a:ext cx="3699720" cy="515880"/>
           </a:xfrm>
           <a:prstGeom prst="rect">
             <a:avLst/>
@@ -4799,7 +4799,7 @@
         <p:spPr>
           <a:xfrm>
             <a:off x="912240" y="1268280"/>
-            <a:ext cx="9210240" cy="363600"/>
+            <a:ext cx="9209880" cy="363240"/>
           </a:xfrm>
           <a:prstGeom prst="rect">
             <a:avLst/>
@@ -4825,7 +4825,7 @@
         <p:spPr>
           <a:xfrm>
             <a:off x="11444760" y="0"/>
-            <a:ext cx="743400" cy="6852240"/>
+            <a:ext cx="743040" cy="6851880"/>
           </a:xfrm>
           <a:prstGeom prst="rect">
             <a:avLst/>
@@ -4855,7 +4855,7 @@
         <p:spPr>
           <a:xfrm>
             <a:off x="0" y="6642720"/>
-            <a:ext cx="12184920" cy="211320"/>
+            <a:ext cx="12184560" cy="211320"/>
           </a:xfrm>
           <a:prstGeom prst="rect">
             <a:avLst/>
@@ -5200,7 +5200,7 @@
         <p:spPr>
           <a:xfrm>
             <a:off x="11444760" y="0"/>
-            <a:ext cx="743400" cy="6852240"/>
+            <a:ext cx="743040" cy="6851880"/>
           </a:xfrm>
           <a:prstGeom prst="rect">
             <a:avLst/>
@@ -5230,7 +5230,7 @@
         <p:spPr>
           <a:xfrm>
             <a:off x="11438640" y="6453360"/>
-            <a:ext cx="760320" cy="363960"/>
+            <a:ext cx="759960" cy="363960"/>
           </a:xfrm>
           <a:prstGeom prst="rect">
             <a:avLst/>
@@ -5260,7 +5260,7 @@
                 <a:tab algn="l" pos="408240"/>
               </a:tabLst>
             </a:pPr>
-            <a:fld id="{42CBA020-207F-424A-BAE1-CB86536CC586}" type="slidenum">
+            <a:fld id="{3CC82EE1-7C29-49CC-BC0C-10AF60AD452F}" type="slidenum">
               <a:rPr b="0" lang="en-US" sz="1800" spc="-1" strike="noStrike">
                 <a:solidFill>
                   <a:srgbClr val="808080"/>
@@ -5285,7 +5285,7 @@
         <p:spPr>
           <a:xfrm>
             <a:off x="912240" y="1268280"/>
-            <a:ext cx="9210240" cy="363600"/>
+            <a:ext cx="9209880" cy="363240"/>
           </a:xfrm>
           <a:prstGeom prst="rect">
             <a:avLst/>
@@ -5315,7 +5315,7 @@
         <p:spPr>
           <a:xfrm>
             <a:off x="0" y="0"/>
-            <a:ext cx="3054240" cy="564120"/>
+            <a:ext cx="3053880" cy="563760"/>
           </a:xfrm>
           <a:prstGeom prst="rect">
             <a:avLst/>
@@ -5338,7 +5338,7 @@
         <p:spPr>
           <a:xfrm>
             <a:off x="7430400" y="134640"/>
-            <a:ext cx="3700080" cy="516240"/>
+            <a:ext cx="3699720" cy="515880"/>
           </a:xfrm>
           <a:prstGeom prst="rect">
             <a:avLst/>
@@ -5357,7 +5357,7 @@
         <p:spPr>
           <a:xfrm>
             <a:off x="11444760" y="0"/>
-            <a:ext cx="743400" cy="6852240"/>
+            <a:ext cx="743040" cy="6851880"/>
           </a:xfrm>
           <a:prstGeom prst="rect">
             <a:avLst/>
@@ -5387,7 +5387,7 @@
         <p:spPr>
           <a:xfrm>
             <a:off x="11438640" y="6453360"/>
-            <a:ext cx="760320" cy="363960"/>
+            <a:ext cx="759960" cy="363960"/>
           </a:xfrm>
           <a:prstGeom prst="rect">
             <a:avLst/>
@@ -5417,7 +5417,7 @@
                 <a:tab algn="l" pos="408240"/>
               </a:tabLst>
             </a:pPr>
-            <a:fld id="{87D4FDE6-4556-4282-9783-3DC47A86DF80}" type="slidenum">
+            <a:fld id="{E58BAF38-1087-4EF2-A7A5-26E718E47F6F}" type="slidenum">
               <a:rPr b="0" lang="en-US" sz="1800" spc="-1" strike="noStrike">
                 <a:solidFill>
                   <a:srgbClr val="808080"/>
@@ -5442,7 +5442,7 @@
         <p:spPr>
           <a:xfrm>
             <a:off x="0" y="6642720"/>
-            <a:ext cx="12184920" cy="211320"/>
+            <a:ext cx="12184560" cy="211320"/>
           </a:xfrm>
           <a:prstGeom prst="rect">
             <a:avLst/>
@@ -5787,7 +5787,7 @@
         <p:spPr>
           <a:xfrm>
             <a:off x="11444760" y="0"/>
-            <a:ext cx="743400" cy="6852240"/>
+            <a:ext cx="743040" cy="6851880"/>
           </a:xfrm>
           <a:prstGeom prst="rect">
             <a:avLst/>
@@ -5817,7 +5817,7 @@
         <p:spPr>
           <a:xfrm>
             <a:off x="11438640" y="6453360"/>
-            <a:ext cx="760320" cy="363960"/>
+            <a:ext cx="759960" cy="363960"/>
           </a:xfrm>
           <a:prstGeom prst="rect">
             <a:avLst/>
@@ -5847,7 +5847,7 @@
                 <a:tab algn="l" pos="408240"/>
               </a:tabLst>
             </a:pPr>
-            <a:fld id="{DCAAB0BF-BE07-4462-8C3A-F65C9A3297B6}" type="slidenum">
+            <a:fld id="{9EDC971B-3EA8-454C-9010-CB1F29D555F7}" type="slidenum">
               <a:rPr b="0" lang="en-US" sz="1800" spc="-1" strike="noStrike">
                 <a:solidFill>
                   <a:srgbClr val="808080"/>
@@ -5872,7 +5872,7 @@
         <p:spPr>
           <a:xfrm>
             <a:off x="912240" y="1268280"/>
-            <a:ext cx="9210240" cy="363600"/>
+            <a:ext cx="9209880" cy="363240"/>
           </a:xfrm>
           <a:prstGeom prst="rect">
             <a:avLst/>
@@ -5902,7 +5902,7 @@
         <p:spPr>
           <a:xfrm>
             <a:off x="0" y="0"/>
-            <a:ext cx="3054240" cy="564120"/>
+            <a:ext cx="3053880" cy="563760"/>
           </a:xfrm>
           <a:prstGeom prst="rect">
             <a:avLst/>
@@ -5925,7 +5925,7 @@
         <p:spPr>
           <a:xfrm>
             <a:off x="7430400" y="134640"/>
-            <a:ext cx="3700080" cy="516240"/>
+            <a:ext cx="3699720" cy="515880"/>
           </a:xfrm>
           <a:prstGeom prst="rect">
             <a:avLst/>
@@ -5944,7 +5944,7 @@
         <p:spPr>
           <a:xfrm>
             <a:off x="11444760" y="0"/>
-            <a:ext cx="743400" cy="6852240"/>
+            <a:ext cx="743040" cy="6851880"/>
           </a:xfrm>
           <a:prstGeom prst="rect">
             <a:avLst/>
@@ -5974,7 +5974,7 @@
         <p:spPr>
           <a:xfrm>
             <a:off x="11438640" y="6453360"/>
-            <a:ext cx="760320" cy="363960"/>
+            <a:ext cx="759960" cy="363960"/>
           </a:xfrm>
           <a:prstGeom prst="rect">
             <a:avLst/>
@@ -6004,7 +6004,7 @@
                 <a:tab algn="l" pos="408240"/>
               </a:tabLst>
             </a:pPr>
-            <a:fld id="{D3BA9CEC-B934-4117-9175-3502D31B5E6E}" type="slidenum">
+            <a:fld id="{F3C4FA4C-52D1-4DBD-B3C3-F26F40CC5554}" type="slidenum">
               <a:rPr b="0" lang="en-US" sz="1800" spc="-1" strike="noStrike">
                 <a:solidFill>
                   <a:srgbClr val="808080"/>
@@ -6029,7 +6029,7 @@
         <p:spPr>
           <a:xfrm>
             <a:off x="0" y="6642720"/>
-            <a:ext cx="12184920" cy="211320"/>
+            <a:ext cx="12184560" cy="211320"/>
           </a:xfrm>
           <a:prstGeom prst="rect">
             <a:avLst/>
@@ -6367,7 +6367,7 @@
         <p:spPr>
           <a:xfrm>
             <a:off x="527400" y="1412640"/>
-            <a:ext cx="10363320" cy="1149840"/>
+            <a:ext cx="10362960" cy="1149480"/>
           </a:xfrm>
           <a:prstGeom prst="rect">
             <a:avLst/>
@@ -6422,7 +6422,7 @@
         <p:spPr>
           <a:xfrm>
             <a:off x="527400" y="2852640"/>
-            <a:ext cx="10363320" cy="2370600"/>
+            <a:ext cx="10362960" cy="2370240"/>
           </a:xfrm>
           <a:prstGeom prst="rect">
             <a:avLst/>
@@ -6652,7 +6652,7 @@
         <p:spPr>
           <a:xfrm>
             <a:off x="335520" y="764640"/>
-            <a:ext cx="10747440" cy="498240"/>
+            <a:ext cx="10747080" cy="497880"/>
           </a:xfrm>
           <a:prstGeom prst="rect">
             <a:avLst/>
@@ -6707,7 +6707,7 @@
         <p:spPr>
           <a:xfrm>
             <a:off x="457200" y="1371600"/>
-            <a:ext cx="10785240" cy="3669120"/>
+            <a:ext cx="10784880" cy="3668760"/>
           </a:xfrm>
           <a:prstGeom prst="rect">
             <a:avLst/>
@@ -7104,7 +7104,7 @@
         <p:spPr>
           <a:xfrm>
             <a:off x="335520" y="764640"/>
-            <a:ext cx="10747440" cy="498240"/>
+            <a:ext cx="10747080" cy="497880"/>
           </a:xfrm>
           <a:prstGeom prst="rect">
             <a:avLst/>
@@ -7159,7 +7159,7 @@
         <p:spPr>
           <a:xfrm>
             <a:off x="457200" y="1371600"/>
-            <a:ext cx="10785240" cy="4692960"/>
+            <a:ext cx="10784880" cy="4692600"/>
           </a:xfrm>
           <a:prstGeom prst="rect">
             <a:avLst/>
@@ -7677,7 +7677,7 @@
         <p:spPr>
           <a:xfrm>
             <a:off x="335520" y="764640"/>
-            <a:ext cx="10747440" cy="498240"/>
+            <a:ext cx="10747080" cy="497880"/>
           </a:xfrm>
           <a:prstGeom prst="rect">
             <a:avLst/>
@@ -7732,7 +7732,7 @@
         <p:spPr>
           <a:xfrm>
             <a:off x="457200" y="1371600"/>
-            <a:ext cx="10785240" cy="3413160"/>
+            <a:ext cx="10784880" cy="3412800"/>
           </a:xfrm>
           <a:prstGeom prst="rect">
             <a:avLst/>
@@ -8125,7 +8125,7 @@
         <p:spPr>
           <a:xfrm>
             <a:off x="335520" y="764640"/>
-            <a:ext cx="10747440" cy="498240"/>
+            <a:ext cx="10747080" cy="497880"/>
           </a:xfrm>
           <a:prstGeom prst="rect">
             <a:avLst/>
@@ -8180,7 +8180,7 @@
         <p:spPr>
           <a:xfrm>
             <a:off x="457200" y="1371600"/>
-            <a:ext cx="10785240" cy="3669120"/>
+            <a:ext cx="10784880" cy="3668760"/>
           </a:xfrm>
           <a:prstGeom prst="rect">
             <a:avLst/>
@@ -8602,7 +8602,7 @@
         <p:spPr>
           <a:xfrm>
             <a:off x="335520" y="764640"/>
-            <a:ext cx="10747440" cy="498240"/>
+            <a:ext cx="10747080" cy="497880"/>
           </a:xfrm>
           <a:prstGeom prst="rect">
             <a:avLst/>
@@ -8657,7 +8657,7 @@
         <p:spPr>
           <a:xfrm>
             <a:off x="457200" y="1371600"/>
-            <a:ext cx="10785240" cy="1877400"/>
+            <a:ext cx="10784880" cy="1877040"/>
           </a:xfrm>
           <a:prstGeom prst="rect">
             <a:avLst/>
@@ -8896,7 +8896,7 @@
         <p:spPr>
           <a:xfrm>
             <a:off x="335520" y="4406760"/>
-            <a:ext cx="10747440" cy="1356480"/>
+            <a:ext cx="10747080" cy="1356120"/>
           </a:xfrm>
           <a:prstGeom prst="rect">
             <a:avLst/>
@@ -8951,7 +8951,7 @@
         <p:spPr>
           <a:xfrm>
             <a:off x="335520" y="2906640"/>
-            <a:ext cx="10747440" cy="1494360"/>
+            <a:ext cx="10747080" cy="1494000"/>
           </a:xfrm>
           <a:prstGeom prst="rect">
             <a:avLst/>
@@ -9007,7 +9007,7 @@
         <p:spPr>
           <a:xfrm>
             <a:off x="335520" y="764640"/>
-            <a:ext cx="10747440" cy="498240"/>
+            <a:ext cx="10747080" cy="497880"/>
           </a:xfrm>
           <a:prstGeom prst="rect">
             <a:avLst/>
@@ -9062,7 +9062,7 @@
         <p:spPr>
           <a:xfrm>
             <a:off x="457200" y="1371600"/>
-            <a:ext cx="10785240" cy="1877400"/>
+            <a:ext cx="10784880" cy="1877040"/>
           </a:xfrm>
           <a:prstGeom prst="rect">
             <a:avLst/>
@@ -9083,7 +9083,7 @@
             <a:noAutofit/>
           </a:bodyPr>
           <a:p>
-            <a:pPr marL="216000" indent="-212760">
+            <a:pPr marL="216000" indent="-216000">
               <a:lnSpc>
                 <a:spcPct val="100000"/>
               </a:lnSpc>
@@ -9091,8 +9091,8 @@
                 <a:srgbClr val="008c4f"/>
               </a:buClr>
               <a:buSzPct val="115000"/>
-              <a:buFont typeface="icomoon"/>
-              <a:buChar char=""/>
+              <a:buFont typeface="Wingdings 2" charset="2"/>
+              <a:buChar char=""/>
               <a:tabLst>
                 <a:tab algn="l" pos="408240"/>
               </a:tabLst>
@@ -9112,7 +9112,7 @@
             </a:endParaRPr>
           </a:p>
           <a:p>
-            <a:pPr marL="216000" indent="-212760">
+            <a:pPr marL="216000" indent="-216000">
               <a:lnSpc>
                 <a:spcPct val="100000"/>
               </a:lnSpc>
@@ -9120,8 +9120,8 @@
                 <a:srgbClr val="008c4f"/>
               </a:buClr>
               <a:buSzPct val="115000"/>
-              <a:buFont typeface="icomoon"/>
-              <a:buChar char=""/>
+              <a:buFont typeface="Wingdings 2" charset="2"/>
+              <a:buChar char=""/>
               <a:tabLst>
                 <a:tab algn="l" pos="408240"/>
               </a:tabLst>
@@ -9141,45 +9141,7 @@
             </a:endParaRPr>
           </a:p>
           <a:p>
-            <a:pPr>
-              <a:lnSpc>
-                <a:spcPct val="100000"/>
-              </a:lnSpc>
-              <a:buNone/>
-              <a:tabLst>
-                <a:tab algn="l" pos="408240"/>
-              </a:tabLst>
-            </a:pPr>
-            <a:endParaRPr b="0" lang="en-US" sz="1800" spc="-1" strike="noStrike">
-              <a:latin typeface="DejaVu Sans"/>
-            </a:endParaRPr>
-          </a:p>
-          <a:p>
-            <a:pPr>
-              <a:lnSpc>
-                <a:spcPct val="100000"/>
-              </a:lnSpc>
-              <a:buNone/>
-              <a:tabLst>
-                <a:tab algn="l" pos="408240"/>
-              </a:tabLst>
-            </a:pPr>
-            <a:r>
-              <a:rPr b="0" lang="en-US" sz="1800" spc="-1" strike="noStrike">
-                <a:solidFill>
-                  <a:srgbClr val="000000"/>
-                </a:solidFill>
-                <a:latin typeface="DejaVu Sans"/>
-                <a:ea typeface="DejaVu Sans"/>
-              </a:rPr>
-              <a:t>Examples:</a:t>
-            </a:r>
-            <a:endParaRPr b="0" lang="en-US" sz="1800" spc="-1" strike="noStrike">
-              <a:latin typeface="DejaVu Sans"/>
-            </a:endParaRPr>
-          </a:p>
-          <a:p>
-            <a:pPr marL="216000" indent="-212760">
+            <a:pPr marL="216000" indent="-216000">
               <a:lnSpc>
                 <a:spcPct val="100000"/>
               </a:lnSpc>
@@ -9187,28 +9149,18 @@
                 <a:srgbClr val="008c4f"/>
               </a:buClr>
               <a:buSzPct val="115000"/>
-              <a:buFont typeface="icomoon"/>
-              <a:buChar char=""/>
-              <a:tabLst>
-                <a:tab algn="l" pos="408240"/>
-              </a:tabLst>
-            </a:pPr>
-            <a:r>
-              <a:rPr b="0" lang="en-US" sz="1800" spc="-1" strike="noStrike">
-                <a:solidFill>
-                  <a:srgbClr val="000000"/>
-                </a:solidFill>
-                <a:latin typeface="DejaVu Sans"/>
-                <a:ea typeface="DejaVu Sans"/>
-              </a:rPr>
-              <a:t>Cellular networks (UMTS/LTE/5G)</a:t>
-            </a:r>
-            <a:endParaRPr b="0" lang="en-US" sz="1800" spc="-1" strike="noStrike">
-              <a:latin typeface="DejaVu Sans"/>
-            </a:endParaRPr>
-          </a:p>
-          <a:p>
-            <a:pPr marL="216000" indent="-212760">
+              <a:buFont typeface="Wingdings 2" charset="2"/>
+              <a:buChar char=""/>
+              <a:tabLst>
+                <a:tab algn="l" pos="408240"/>
+              </a:tabLst>
+            </a:pPr>
+            <a:endParaRPr b="0" lang="en-US" sz="1800" spc="-1" strike="noStrike">
+              <a:latin typeface="DejaVu Sans"/>
+            </a:endParaRPr>
+          </a:p>
+          <a:p>
+            <a:pPr marL="216000" indent="-216000">
               <a:lnSpc>
                 <a:spcPct val="100000"/>
               </a:lnSpc>
@@ -9216,68 +9168,28 @@
                 <a:srgbClr val="008c4f"/>
               </a:buClr>
               <a:buSzPct val="115000"/>
-              <a:buFont typeface="icomoon"/>
-              <a:buChar char=""/>
-              <a:tabLst>
-                <a:tab algn="l" pos="408240"/>
-              </a:tabLst>
-            </a:pPr>
-            <a:r>
-              <a:rPr b="0" lang="en-US" sz="1800" spc="-1" strike="noStrike">
-                <a:solidFill>
-                  <a:srgbClr val="000000"/>
-                </a:solidFill>
-                <a:latin typeface="DejaVu Sans"/>
-                <a:ea typeface="DejaVu Sans"/>
-              </a:rPr>
-              <a:t>LoRa (</a:t>
-            </a:r>
-            <a:r>
-              <a:rPr b="1" lang="en-US" sz="1800" spc="-1" strike="noStrike">
-                <a:solidFill>
-                  <a:srgbClr val="000000"/>
-                </a:solidFill>
-                <a:latin typeface="DejaVu Sans"/>
-                <a:ea typeface="DejaVu Sans"/>
-              </a:rPr>
-              <a:t>Lo</a:t>
-            </a:r>
-            <a:r>
-              <a:rPr b="0" lang="en-US" sz="1800" spc="-1" strike="noStrike">
-                <a:solidFill>
-                  <a:srgbClr val="000000"/>
-                </a:solidFill>
-                <a:latin typeface="DejaVu Sans"/>
-                <a:ea typeface="DejaVu Sans"/>
-              </a:rPr>
-              <a:t>ng </a:t>
-            </a:r>
-            <a:r>
-              <a:rPr b="1" lang="en-US" sz="1800" spc="-1" strike="noStrike">
-                <a:solidFill>
-                  <a:srgbClr val="000000"/>
-                </a:solidFill>
-                <a:latin typeface="DejaVu Sans"/>
-                <a:ea typeface="DejaVu Sans"/>
-              </a:rPr>
-              <a:t>Ra</a:t>
-            </a:r>
-            <a:r>
-              <a:rPr b="0" lang="en-US" sz="1800" spc="-1" strike="noStrike">
-                <a:solidFill>
-                  <a:srgbClr val="000000"/>
-                </a:solidFill>
-                <a:latin typeface="DejaVu Sans"/>
-                <a:ea typeface="DejaVu Sans"/>
-              </a:rPr>
-              <a:t>nge, physical layer), LoRaWAN (MAC layer)</a:t>
-            </a:r>
-            <a:endParaRPr b="0" lang="en-US" sz="1800" spc="-1" strike="noStrike">
-              <a:latin typeface="DejaVu Sans"/>
-            </a:endParaRPr>
-          </a:p>
-          <a:p>
-            <a:pPr marL="216000" indent="-212760">
+              <a:buFont typeface="Wingdings 2" charset="2"/>
+              <a:buChar char=""/>
+              <a:tabLst>
+                <a:tab algn="l" pos="408240"/>
+              </a:tabLst>
+            </a:pPr>
+            <a:r>
+              <a:rPr b="0" lang="en-US" sz="1800" spc="-1" strike="noStrike">
+                <a:solidFill>
+                  <a:srgbClr val="000000"/>
+                </a:solidFill>
+                <a:latin typeface="DejaVu Sans"/>
+                <a:ea typeface="DejaVu Sans"/>
+              </a:rPr>
+              <a:t>Examples:</a:t>
+            </a:r>
+            <a:endParaRPr b="0" lang="en-US" sz="1800" spc="-1" strike="noStrike">
+              <a:latin typeface="DejaVu Sans"/>
+            </a:endParaRPr>
+          </a:p>
+          <a:p>
+            <a:pPr marL="216000" indent="-216000">
               <a:lnSpc>
                 <a:spcPct val="100000"/>
               </a:lnSpc>
@@ -9285,8 +9197,106 @@
                 <a:srgbClr val="008c4f"/>
               </a:buClr>
               <a:buSzPct val="115000"/>
-              <a:buFont typeface="icomoon"/>
-              <a:buChar char=""/>
+              <a:buFont typeface="Wingdings 2" charset="2"/>
+              <a:buChar char=""/>
+              <a:tabLst>
+                <a:tab algn="l" pos="408240"/>
+              </a:tabLst>
+            </a:pPr>
+            <a:r>
+              <a:rPr b="0" lang="en-US" sz="1800" spc="-1" strike="noStrike">
+                <a:solidFill>
+                  <a:srgbClr val="000000"/>
+                </a:solidFill>
+                <a:latin typeface="DejaVu Sans"/>
+                <a:ea typeface="DejaVu Sans"/>
+              </a:rPr>
+              <a:t>Cellular networks (UMTS/LTE/5G)</a:t>
+            </a:r>
+            <a:endParaRPr b="0" lang="en-US" sz="1800" spc="-1" strike="noStrike">
+              <a:latin typeface="DejaVu Sans"/>
+            </a:endParaRPr>
+          </a:p>
+          <a:p>
+            <a:pPr marL="216000" indent="-216000">
+              <a:lnSpc>
+                <a:spcPct val="100000"/>
+              </a:lnSpc>
+              <a:buClr>
+                <a:srgbClr val="008c4f"/>
+              </a:buClr>
+              <a:buSzPct val="115000"/>
+              <a:buFont typeface="Wingdings 2" charset="2"/>
+              <a:buChar char=""/>
+              <a:tabLst>
+                <a:tab algn="l" pos="408240"/>
+              </a:tabLst>
+            </a:pPr>
+            <a:r>
+              <a:rPr b="0" lang="en-US" sz="1800" spc="-1" strike="noStrike">
+                <a:solidFill>
+                  <a:srgbClr val="000000"/>
+                </a:solidFill>
+                <a:latin typeface="DejaVu Sans"/>
+                <a:ea typeface="DejaVu Sans"/>
+              </a:rPr>
+              <a:t>LoRa (</a:t>
+            </a:r>
+            <a:r>
+              <a:rPr b="1" lang="en-US" sz="1800" spc="-1" strike="noStrike">
+                <a:solidFill>
+                  <a:srgbClr val="000000"/>
+                </a:solidFill>
+                <a:latin typeface="DejaVu Sans"/>
+                <a:ea typeface="DejaVu Sans"/>
+              </a:rPr>
+              <a:t>Lo</a:t>
+            </a:r>
+            <a:r>
+              <a:rPr b="0" lang="en-US" sz="1800" spc="-1" strike="noStrike">
+                <a:solidFill>
+                  <a:srgbClr val="000000"/>
+                </a:solidFill>
+                <a:latin typeface="DejaVu Sans"/>
+                <a:ea typeface="DejaVu Sans"/>
+              </a:rPr>
+              <a:t>ng </a:t>
+            </a:r>
+            <a:r>
+              <a:rPr b="1" lang="en-US" sz="1800" spc="-1" strike="noStrike">
+                <a:solidFill>
+                  <a:srgbClr val="000000"/>
+                </a:solidFill>
+                <a:latin typeface="DejaVu Sans"/>
+                <a:ea typeface="DejaVu Sans"/>
+              </a:rPr>
+              <a:t>Ra</a:t>
+            </a:r>
+            <a:r>
+              <a:rPr b="0" lang="en-US" sz="1800" spc="-1" strike="noStrike">
+                <a:solidFill>
+                  <a:srgbClr val="000000"/>
+                </a:solidFill>
+                <a:latin typeface="DejaVu Sans"/>
+                <a:ea typeface="DejaVu Sans"/>
+              </a:rPr>
+              <a:t>nge, physical layer), LoRaWAN (MAC layer)</a:t>
+            </a:r>
+            <a:endParaRPr b="0" lang="en-US" sz="1800" spc="-1" strike="noStrike">
+              <a:latin typeface="DejaVu Sans"/>
+            </a:endParaRPr>
+          </a:p>
+          <a:p>
+            <a:pPr marL="216000" indent="-216000">
+              <a:lnSpc>
+                <a:spcPct val="100000"/>
+              </a:lnSpc>
+              <a:buClr>
+                <a:srgbClr val="008c4f"/>
+              </a:buClr>
+              <a:buSzPct val="115000"/>
+              <a:buFont typeface="Wingdings 2" charset="2"/>
+              <a:buChar char=""/>
               <a:tabLst>
                 <a:tab algn="l" pos="408240"/>
               </a:tabLst>
@@ -9346,7 +9356,7 @@
         <p:spPr>
           <a:xfrm>
             <a:off x="335520" y="764640"/>
-            <a:ext cx="10747440" cy="498240"/>
+            <a:ext cx="10747080" cy="497880"/>
           </a:xfrm>
           <a:prstGeom prst="rect">
             <a:avLst/>
@@ -9401,7 +9411,7 @@
         <p:spPr>
           <a:xfrm>
             <a:off x="457200" y="1371600"/>
-            <a:ext cx="10785240" cy="2133360"/>
+            <a:ext cx="10784880" cy="2133000"/>
           </a:xfrm>
           <a:prstGeom prst="rect">
             <a:avLst/>
@@ -9422,7 +9432,7 @@
             <a:noAutofit/>
           </a:bodyPr>
           <a:p>
-            <a:pPr marL="216000" indent="-212760">
+            <a:pPr marL="216000" indent="-216000">
               <a:lnSpc>
                 <a:spcPct val="100000"/>
               </a:lnSpc>
@@ -9430,8 +9440,8 @@
                 <a:srgbClr val="008c4f"/>
               </a:buClr>
               <a:buSzPct val="115000"/>
-              <a:buFont typeface="icomoon"/>
-              <a:buChar char=""/>
+              <a:buFont typeface="Wingdings 2" charset="2"/>
+              <a:buChar char=""/>
               <a:tabLst>
                 <a:tab algn="l" pos="408240"/>
               </a:tabLst>
@@ -9451,7 +9461,7 @@
             </a:endParaRPr>
           </a:p>
           <a:p>
-            <a:pPr marL="216000" indent="-212760">
+            <a:pPr marL="216000" indent="-216000">
               <a:lnSpc>
                 <a:spcPct val="100000"/>
               </a:lnSpc>
@@ -9459,8 +9469,8 @@
                 <a:srgbClr val="008c4f"/>
               </a:buClr>
               <a:buSzPct val="115000"/>
-              <a:buFont typeface="icomoon"/>
-              <a:buChar char=""/>
+              <a:buFont typeface="Wingdings 2" charset="2"/>
+              <a:buChar char=""/>
               <a:tabLst>
                 <a:tab algn="l" pos="408240"/>
               </a:tabLst>
@@ -9480,7 +9490,7 @@
             </a:endParaRPr>
           </a:p>
           <a:p>
-            <a:pPr marL="216000" indent="-212760">
+            <a:pPr marL="216000" indent="-216000">
               <a:lnSpc>
                 <a:spcPct val="100000"/>
               </a:lnSpc>
@@ -9488,8 +9498,8 @@
                 <a:srgbClr val="008c4f"/>
               </a:buClr>
               <a:buSzPct val="115000"/>
-              <a:buFont typeface="icomoon"/>
-              <a:buChar char=""/>
+              <a:buFont typeface="Wingdings 2" charset="2"/>
+              <a:buChar char=""/>
               <a:tabLst>
                 <a:tab algn="l" pos="408240"/>
               </a:tabLst>
@@ -9509,45 +9519,7 @@
             </a:endParaRPr>
           </a:p>
           <a:p>
-            <a:pPr>
-              <a:lnSpc>
-                <a:spcPct val="100000"/>
-              </a:lnSpc>
-              <a:buNone/>
-              <a:tabLst>
-                <a:tab algn="l" pos="408240"/>
-              </a:tabLst>
-            </a:pPr>
-            <a:endParaRPr b="0" lang="en-US" sz="1800" spc="-1" strike="noStrike">
-              <a:latin typeface="DejaVu Sans"/>
-            </a:endParaRPr>
-          </a:p>
-          <a:p>
-            <a:pPr>
-              <a:lnSpc>
-                <a:spcPct val="100000"/>
-              </a:lnSpc>
-              <a:buNone/>
-              <a:tabLst>
-                <a:tab algn="l" pos="408240"/>
-              </a:tabLst>
-            </a:pPr>
-            <a:r>
-              <a:rPr b="0" lang="en-US" sz="1800" spc="-1" strike="noStrike">
-                <a:solidFill>
-                  <a:srgbClr val="000000"/>
-                </a:solidFill>
-                <a:latin typeface="DejaVu Sans"/>
-                <a:ea typeface="DejaVu Sans"/>
-              </a:rPr>
-              <a:t>Network planning</a:t>
-            </a:r>
-            <a:endParaRPr b="0" lang="en-US" sz="1800" spc="-1" strike="noStrike">
-              <a:latin typeface="DejaVu Sans"/>
-            </a:endParaRPr>
-          </a:p>
-          <a:p>
-            <a:pPr marL="216000" indent="-212760">
+            <a:pPr marL="216000" indent="-216000">
               <a:lnSpc>
                 <a:spcPct val="100000"/>
               </a:lnSpc>
@@ -9555,28 +9527,18 @@
                 <a:srgbClr val="008c4f"/>
               </a:buClr>
               <a:buSzPct val="115000"/>
-              <a:buFont typeface="icomoon"/>
-              <a:buChar char=""/>
-              <a:tabLst>
-                <a:tab algn="l" pos="408240"/>
-              </a:tabLst>
-            </a:pPr>
-            <a:r>
-              <a:rPr b="0" lang="en-US" sz="1800" spc="-1" strike="noStrike">
-                <a:solidFill>
-                  <a:srgbClr val="000000"/>
-                </a:solidFill>
-                <a:latin typeface="DejaVu Sans"/>
-                <a:ea typeface="DejaVu Sans"/>
-              </a:rPr>
-              <a:t>Space division multiple access</a:t>
-            </a:r>
-            <a:endParaRPr b="0" lang="en-US" sz="1800" spc="-1" strike="noStrike">
-              <a:latin typeface="DejaVu Sans"/>
-            </a:endParaRPr>
-          </a:p>
-          <a:p>
-            <a:pPr marL="216000" indent="-212760">
+              <a:buFont typeface="Wingdings 2" charset="2"/>
+              <a:buChar char=""/>
+              <a:tabLst>
+                <a:tab algn="l" pos="408240"/>
+              </a:tabLst>
+            </a:pPr>
+            <a:endParaRPr b="0" lang="en-US" sz="1800" spc="-1" strike="noStrike">
+              <a:latin typeface="DejaVu Sans"/>
+            </a:endParaRPr>
+          </a:p>
+          <a:p>
+            <a:pPr marL="216000" indent="-216000">
               <a:lnSpc>
                 <a:spcPct val="100000"/>
               </a:lnSpc>
@@ -9584,28 +9546,28 @@
                 <a:srgbClr val="008c4f"/>
               </a:buClr>
               <a:buSzPct val="115000"/>
-              <a:buFont typeface="icomoon"/>
-              <a:buChar char=""/>
-              <a:tabLst>
-                <a:tab algn="l" pos="408240"/>
-              </a:tabLst>
-            </a:pPr>
-            <a:r>
-              <a:rPr b="0" lang="en-US" sz="1800" spc="-1" strike="noStrike">
-                <a:solidFill>
-                  <a:srgbClr val="000000"/>
-                </a:solidFill>
-                <a:latin typeface="DejaVu Sans"/>
-                <a:ea typeface="DejaVu Sans"/>
-              </a:rPr>
-              <a:t>Minimize interference</a:t>
-            </a:r>
-            <a:endParaRPr b="0" lang="en-US" sz="1800" spc="-1" strike="noStrike">
-              <a:latin typeface="DejaVu Sans"/>
-            </a:endParaRPr>
-          </a:p>
-          <a:p>
-            <a:pPr marL="216000" indent="-212760">
+              <a:buFont typeface="Wingdings 2" charset="2"/>
+              <a:buChar char=""/>
+              <a:tabLst>
+                <a:tab algn="l" pos="408240"/>
+              </a:tabLst>
+            </a:pPr>
+            <a:r>
+              <a:rPr b="0" lang="en-US" sz="1800" spc="-1" strike="noStrike">
+                <a:solidFill>
+                  <a:srgbClr val="000000"/>
+                </a:solidFill>
+                <a:latin typeface="DejaVu Sans"/>
+                <a:ea typeface="DejaVu Sans"/>
+              </a:rPr>
+              <a:t>Network planning</a:t>
+            </a:r>
+            <a:endParaRPr b="0" lang="en-US" sz="1800" spc="-1" strike="noStrike">
+              <a:latin typeface="DejaVu Sans"/>
+            </a:endParaRPr>
+          </a:p>
+          <a:p>
+            <a:pPr marL="216000" indent="-216000">
               <a:lnSpc>
                 <a:spcPct val="100000"/>
               </a:lnSpc>
@@ -9613,8 +9575,66 @@
                 <a:srgbClr val="008c4f"/>
               </a:buClr>
               <a:buSzPct val="115000"/>
-              <a:buFont typeface="icomoon"/>
-              <a:buChar char=""/>
+              <a:buFont typeface="Wingdings 2" charset="2"/>
+              <a:buChar char=""/>
+              <a:tabLst>
+                <a:tab algn="l" pos="408240"/>
+              </a:tabLst>
+            </a:pPr>
+            <a:r>
+              <a:rPr b="0" lang="en-US" sz="1800" spc="-1" strike="noStrike">
+                <a:solidFill>
+                  <a:srgbClr val="000000"/>
+                </a:solidFill>
+                <a:latin typeface="DejaVu Sans"/>
+                <a:ea typeface="DejaVu Sans"/>
+              </a:rPr>
+              <a:t>Space division multiple access</a:t>
+            </a:r>
+            <a:endParaRPr b="0" lang="en-US" sz="1800" spc="-1" strike="noStrike">
+              <a:latin typeface="DejaVu Sans"/>
+            </a:endParaRPr>
+          </a:p>
+          <a:p>
+            <a:pPr marL="216000" indent="-216000">
+              <a:lnSpc>
+                <a:spcPct val="100000"/>
+              </a:lnSpc>
+              <a:buClr>
+                <a:srgbClr val="008c4f"/>
+              </a:buClr>
+              <a:buSzPct val="115000"/>
+              <a:buFont typeface="Wingdings 2" charset="2"/>
+              <a:buChar char=""/>
+              <a:tabLst>
+                <a:tab algn="l" pos="408240"/>
+              </a:tabLst>
+            </a:pPr>
+            <a:r>
+              <a:rPr b="0" lang="en-US" sz="1800" spc="-1" strike="noStrike">
+                <a:solidFill>
+                  <a:srgbClr val="000000"/>
+                </a:solidFill>
+                <a:latin typeface="DejaVu Sans"/>
+                <a:ea typeface="DejaVu Sans"/>
+              </a:rPr>
+              <a:t>Minimize interference</a:t>
+            </a:r>
+            <a:endParaRPr b="0" lang="en-US" sz="1800" spc="-1" strike="noStrike">
+              <a:latin typeface="DejaVu Sans"/>
+            </a:endParaRPr>
+          </a:p>
+          <a:p>
+            <a:pPr marL="216000" indent="-216000">
+              <a:lnSpc>
+                <a:spcPct val="100000"/>
+              </a:lnSpc>
+              <a:buClr>
+                <a:srgbClr val="008c4f"/>
+              </a:buClr>
+              <a:buSzPct val="115000"/>
+              <a:buFont typeface="Wingdings 2" charset="2"/>
+              <a:buChar char=""/>
               <a:tabLst>
                 <a:tab algn="l" pos="408240"/>
               </a:tabLst>
@@ -9674,7 +9694,7 @@
         <p:spPr>
           <a:xfrm>
             <a:off x="335520" y="764640"/>
-            <a:ext cx="10747440" cy="498240"/>
+            <a:ext cx="10747080" cy="497880"/>
           </a:xfrm>
           <a:prstGeom prst="rect">
             <a:avLst/>
@@ -9729,7 +9749,7 @@
         <p:spPr>
           <a:xfrm>
             <a:off x="457200" y="1371600"/>
-            <a:ext cx="10785240" cy="1877400"/>
+            <a:ext cx="10784880" cy="1877040"/>
           </a:xfrm>
           <a:prstGeom prst="rect">
             <a:avLst/>
@@ -9993,7 +10013,7 @@
         <p:spPr>
           <a:xfrm>
             <a:off x="335520" y="764640"/>
-            <a:ext cx="10747440" cy="498240"/>
+            <a:ext cx="10747080" cy="497880"/>
           </a:xfrm>
           <a:prstGeom prst="rect">
             <a:avLst/>
@@ -10048,7 +10068,7 @@
         <p:spPr>
           <a:xfrm>
             <a:off x="457200" y="1371600"/>
-            <a:ext cx="10785240" cy="2133360"/>
+            <a:ext cx="10784880" cy="2133000"/>
           </a:xfrm>
           <a:prstGeom prst="rect">
             <a:avLst/>
@@ -10341,7 +10361,7 @@
         <p:spPr>
           <a:xfrm>
             <a:off x="335520" y="764640"/>
-            <a:ext cx="10737720" cy="488520"/>
+            <a:ext cx="10737360" cy="488160"/>
           </a:xfrm>
           <a:prstGeom prst="rect">
             <a:avLst/>
@@ -10393,7 +10413,7 @@
         <p:spPr>
           <a:xfrm>
             <a:off x="335520" y="1268280"/>
-            <a:ext cx="10737720" cy="5025240"/>
+            <a:ext cx="10737360" cy="5024880"/>
           </a:xfrm>
           <a:prstGeom prst="rect">
             <a:avLst/>
@@ -10615,7 +10635,7 @@
         <p:spPr>
           <a:xfrm>
             <a:off x="335520" y="764640"/>
-            <a:ext cx="10747440" cy="498240"/>
+            <a:ext cx="10747080" cy="497880"/>
           </a:xfrm>
           <a:prstGeom prst="rect">
             <a:avLst/>
@@ -10670,7 +10690,7 @@
         <p:spPr>
           <a:xfrm>
             <a:off x="457200" y="1371600"/>
-            <a:ext cx="10785240" cy="2901240"/>
+            <a:ext cx="10784880" cy="2900880"/>
           </a:xfrm>
           <a:prstGeom prst="rect">
             <a:avLst/>
@@ -11050,7 +11070,7 @@
         <p:spPr>
           <a:xfrm>
             <a:off x="335520" y="4406760"/>
-            <a:ext cx="10747440" cy="1356480"/>
+            <a:ext cx="10747080" cy="1356120"/>
           </a:xfrm>
           <a:prstGeom prst="rect">
             <a:avLst/>
@@ -11105,7 +11125,7 @@
         <p:spPr>
           <a:xfrm>
             <a:off x="335520" y="2906640"/>
-            <a:ext cx="10747440" cy="1494360"/>
+            <a:ext cx="10747080" cy="1494000"/>
           </a:xfrm>
           <a:prstGeom prst="rect">
             <a:avLst/>
@@ -11161,7 +11181,7 @@
         <p:spPr>
           <a:xfrm>
             <a:off x="335520" y="764640"/>
-            <a:ext cx="10747440" cy="498240"/>
+            <a:ext cx="10747080" cy="497880"/>
           </a:xfrm>
           <a:prstGeom prst="rect">
             <a:avLst/>
@@ -11216,7 +11236,7 @@
         <p:spPr>
           <a:xfrm>
             <a:off x="457200" y="1371600"/>
-            <a:ext cx="10785240" cy="3157200"/>
+            <a:ext cx="10784880" cy="3156840"/>
           </a:xfrm>
           <a:prstGeom prst="rect">
             <a:avLst/>
@@ -11600,7 +11620,7 @@
         <p:spPr>
           <a:xfrm>
             <a:off x="335520" y="764640"/>
-            <a:ext cx="10747440" cy="498240"/>
+            <a:ext cx="10747080" cy="497880"/>
           </a:xfrm>
           <a:prstGeom prst="rect">
             <a:avLst/>
@@ -11646,124 +11666,29 @@
           </a:p>
         </p:txBody>
       </p:sp>
-      <p:sp>
-        <p:nvSpPr>
-          <p:cNvPr id="184" name="CustomShape 2"/>
-          <p:cNvSpPr/>
+      <p:pic>
+        <p:nvPicPr>
+          <p:cNvPr id="184" name="" descr=""/>
+          <p:cNvPicPr/>
           <p:nvPr/>
-        </p:nvSpPr>
-        <p:spPr>
-          <a:xfrm>
-            <a:off x="457200" y="1371600"/>
-            <a:ext cx="10785240" cy="853560"/>
-          </a:xfrm>
-          <a:prstGeom prst="rect">
-            <a:avLst/>
-          </a:prstGeom>
-          <a:noFill/>
-          <a:ln w="0">
-            <a:noFill/>
-          </a:ln>
-        </p:spPr>
-        <p:style>
-          <a:lnRef idx="0"/>
-          <a:fillRef idx="0"/>
-          <a:effectRef idx="0"/>
-          <a:fontRef idx="minor"/>
-        </p:style>
-        <p:txBody>
-          <a:bodyPr lIns="90000" rIns="90000" tIns="45000" bIns="45000" anchor="t">
-            <a:noAutofit/>
-          </a:bodyPr>
-          <a:p>
-            <a:pPr marL="216000" indent="-212760">
-              <a:lnSpc>
-                <a:spcPct val="100000"/>
-              </a:lnSpc>
-              <a:buClr>
-                <a:srgbClr val="008c4f"/>
-              </a:buClr>
-              <a:buSzPct val="115000"/>
-              <a:buFont typeface="icomoon"/>
-              <a:buChar char=""/>
-              <a:tabLst>
-                <a:tab algn="l" pos="408240"/>
-              </a:tabLst>
-            </a:pPr>
-            <a:r>
-              <a:rPr b="0" lang="en-US" sz="1800" spc="-1" strike="noStrike">
-                <a:solidFill>
-                  <a:srgbClr val="000000"/>
-                </a:solidFill>
-                <a:latin typeface="DejaVu Sans"/>
-                <a:ea typeface="DejaVu Sans"/>
-              </a:rPr>
-              <a:t>Wireless sensor nodes running Contiki RPL with IPv6</a:t>
-            </a:r>
-            <a:endParaRPr b="0" lang="en-US" sz="1800" spc="-1" strike="noStrike">
-              <a:latin typeface="DejaVu Sans"/>
-            </a:endParaRPr>
-          </a:p>
-          <a:p>
-            <a:pPr marL="216000" indent="-212760">
-              <a:lnSpc>
-                <a:spcPct val="100000"/>
-              </a:lnSpc>
-              <a:buClr>
-                <a:srgbClr val="008c4f"/>
-              </a:buClr>
-              <a:buSzPct val="115000"/>
-              <a:buFont typeface="icomoon"/>
-              <a:buChar char=""/>
-              <a:tabLst>
-                <a:tab algn="l" pos="408240"/>
-              </a:tabLst>
-            </a:pPr>
-            <a:r>
-              <a:rPr b="0" lang="en-US" sz="1800" spc="-1" strike="noStrike">
-                <a:solidFill>
-                  <a:srgbClr val="000000"/>
-                </a:solidFill>
-                <a:latin typeface="DejaVu Sans"/>
-                <a:ea typeface="DejaVu Sans"/>
-              </a:rPr>
-              <a:t>Node attached to gateway over USB acts as gateway</a:t>
-            </a:r>
-            <a:endParaRPr b="0" lang="en-US" sz="1800" spc="-1" strike="noStrike">
-              <a:latin typeface="DejaVu Sans"/>
-            </a:endParaRPr>
-          </a:p>
-          <a:p>
-            <a:pPr marL="216000" indent="-212760">
-              <a:lnSpc>
-                <a:spcPct val="100000"/>
-              </a:lnSpc>
-              <a:buClr>
-                <a:srgbClr val="008c4f"/>
-              </a:buClr>
-              <a:buSzPct val="115000"/>
-              <a:buFont typeface="icomoon"/>
-              <a:buChar char=""/>
-              <a:tabLst>
-                <a:tab algn="l" pos="408240"/>
-              </a:tabLst>
-            </a:pPr>
-            <a:r>
-              <a:rPr b="0" lang="en-US" sz="1800" spc="-1" strike="noStrike">
-                <a:solidFill>
-                  <a:srgbClr val="000000"/>
-                </a:solidFill>
-                <a:latin typeface="DejaVu Sans"/>
-                <a:ea typeface="DejaVu Sans"/>
-              </a:rPr>
-              <a:t>IPv6 connectivity between networks provided through SLIP (Serial Line Internet Procotol)</a:t>
-            </a:r>
-            <a:endParaRPr b="0" lang="en-US" sz="1800" spc="-1" strike="noStrike">
-              <a:latin typeface="DejaVu Sans"/>
-            </a:endParaRPr>
-          </a:p>
-        </p:txBody>
-      </p:sp>
+        </p:nvPicPr>
+        <p:blipFill>
+          <a:blip r:embed="rId1"/>
+          <a:stretch/>
+        </p:blipFill>
+        <p:spPr>
+          <a:xfrm>
+            <a:off x="2709360" y="3474720"/>
+            <a:ext cx="2223360" cy="1652040"/>
+          </a:xfrm>
+          <a:prstGeom prst="rect">
+            <a:avLst/>
+          </a:prstGeom>
+          <a:ln w="0">
+            <a:noFill/>
+          </a:ln>
+        </p:spPr>
+      </p:pic>
       <p:pic>
         <p:nvPicPr>
           <p:cNvPr id="185" name="" descr=""/>
@@ -11771,36 +11696,13 @@
           <p:nvPr/>
         </p:nvPicPr>
         <p:blipFill>
-          <a:blip r:embed="rId1"/>
-          <a:stretch/>
-        </p:blipFill>
-        <p:spPr>
-          <a:xfrm>
-            <a:off x="2709360" y="3474720"/>
-            <a:ext cx="2223720" cy="1652400"/>
-          </a:xfrm>
-          <a:prstGeom prst="rect">
-            <a:avLst/>
-          </a:prstGeom>
-          <a:ln w="0">
-            <a:noFill/>
-          </a:ln>
-        </p:spPr>
-      </p:pic>
-      <p:pic>
-        <p:nvPicPr>
-          <p:cNvPr id="186" name="" descr=""/>
-          <p:cNvPicPr/>
-          <p:nvPr/>
-        </p:nvPicPr>
-        <p:blipFill>
           <a:blip r:embed="rId2"/>
           <a:stretch/>
         </p:blipFill>
         <p:spPr>
           <a:xfrm>
             <a:off x="5544000" y="3383280"/>
-            <a:ext cx="2223720" cy="1652400"/>
+            <a:ext cx="2223360" cy="1652040"/>
           </a:xfrm>
           <a:prstGeom prst="rect">
             <a:avLst/>
@@ -11810,6 +11712,138 @@
           </a:ln>
         </p:spPr>
       </p:pic>
+      <p:sp>
+        <p:nvSpPr>
+          <p:cNvPr id="186" name="CustomShape 3"/>
+          <p:cNvSpPr/>
+          <p:nvPr/>
+        </p:nvSpPr>
+        <p:spPr>
+          <a:xfrm>
+            <a:off x="457200" y="1462320"/>
+            <a:ext cx="10784880" cy="3156840"/>
+          </a:xfrm>
+          <a:prstGeom prst="rect">
+            <a:avLst/>
+          </a:prstGeom>
+          <a:noFill/>
+          <a:ln w="0">
+            <a:noFill/>
+          </a:ln>
+        </p:spPr>
+        <p:style>
+          <a:lnRef idx="0"/>
+          <a:fillRef idx="0"/>
+          <a:effectRef idx="0"/>
+          <a:fontRef idx="minor"/>
+        </p:style>
+        <p:txBody>
+          <a:bodyPr lIns="90000" rIns="90000" tIns="45000" bIns="45000" anchor="t">
+            <a:noAutofit/>
+          </a:bodyPr>
+          <a:p>
+            <a:pPr>
+              <a:lnSpc>
+                <a:spcPct val="100000"/>
+              </a:lnSpc>
+              <a:buNone/>
+              <a:tabLst>
+                <a:tab algn="l" pos="408240"/>
+              </a:tabLst>
+            </a:pPr>
+            <a:endParaRPr b="0" lang="en-US" sz="1800" spc="-1" strike="noStrike">
+              <a:latin typeface="DejaVu Sans"/>
+            </a:endParaRPr>
+          </a:p>
+          <a:p>
+            <a:pPr marL="216000" indent="-212760">
+              <a:lnSpc>
+                <a:spcPct val="100000"/>
+              </a:lnSpc>
+              <a:buClr>
+                <a:srgbClr val="008c4f"/>
+              </a:buClr>
+              <a:buSzPct val="115000"/>
+              <a:buFont typeface="Wingdings 2" charset="2"/>
+              <a:buChar char=""/>
+              <a:tabLst>
+                <a:tab algn="l" pos="408240"/>
+              </a:tabLst>
+            </a:pPr>
+            <a:r>
+              <a:rPr b="0" lang="en-US" sz="1800" spc="-1" strike="noStrike">
+                <a:solidFill>
+                  <a:srgbClr val="000000"/>
+                </a:solidFill>
+                <a:latin typeface="DejaVu Sans"/>
+                <a:ea typeface="DejaVu Sans"/>
+              </a:rPr>
+              <a:t>Wireless sensor nodes running Contiki RPL with Ipv6</a:t>
+            </a:r>
+            <a:endParaRPr b="0" lang="en-US" sz="1800" spc="-1" strike="noStrike">
+              <a:latin typeface="DejaVu Sans"/>
+            </a:endParaRPr>
+          </a:p>
+          <a:p>
+            <a:pPr marL="216000" indent="-212760">
+              <a:lnSpc>
+                <a:spcPct val="100000"/>
+              </a:lnSpc>
+              <a:buClr>
+                <a:srgbClr val="008c4f"/>
+              </a:buClr>
+              <a:buSzPct val="115000"/>
+              <a:buFont typeface="Wingdings 2" charset="2"/>
+              <a:buChar char=""/>
+              <a:tabLst>
+                <a:tab algn="l" pos="408240"/>
+              </a:tabLst>
+            </a:pPr>
+            <a:r>
+              <a:rPr b="0" lang="en-US" sz="1800" spc="-1" strike="noStrike">
+                <a:solidFill>
+                  <a:srgbClr val="000000"/>
+                </a:solidFill>
+                <a:latin typeface="DejaVu Sans"/>
+                <a:ea typeface="DejaVu Sans"/>
+              </a:rPr>
+              <a:t>Node attached to gateway over USB acts as gateway</a:t>
+            </a:r>
+            <a:endParaRPr b="0" lang="en-US" sz="1800" spc="-1" strike="noStrike">
+              <a:latin typeface="DejaVu Sans"/>
+            </a:endParaRPr>
+          </a:p>
+          <a:p>
+            <a:pPr marL="216000" indent="-212760">
+              <a:lnSpc>
+                <a:spcPct val="100000"/>
+              </a:lnSpc>
+              <a:buClr>
+                <a:srgbClr val="008c4f"/>
+              </a:buClr>
+              <a:buSzPct val="115000"/>
+              <a:buFont typeface="Wingdings 2" charset="2"/>
+              <a:buChar char=""/>
+              <a:tabLst>
+                <a:tab algn="l" pos="408240"/>
+              </a:tabLst>
+            </a:pPr>
+            <a:r>
+              <a:rPr b="0" lang="en-US" sz="1800" spc="-1" strike="noStrike">
+                <a:solidFill>
+                  <a:srgbClr val="000000"/>
+                </a:solidFill>
+                <a:latin typeface="DejaVu Sans"/>
+                <a:ea typeface="DejaVu Sans"/>
+              </a:rPr>
+              <a:t>IPv6 connectivity between networks provided through SLIP (Serial Line Internet Protocol)</a:t>
+            </a:r>
+            <a:endParaRPr b="0" lang="en-US" sz="1800" spc="-1" strike="noStrike">
+              <a:latin typeface="DejaVu Sans"/>
+            </a:endParaRPr>
+          </a:p>
+        </p:txBody>
+      </p:sp>
     </p:spTree>
   </p:cSld>
   <mc:AlternateContent>
@@ -11849,7 +11883,7 @@
         <p:spPr>
           <a:xfrm>
             <a:off x="335520" y="1268640"/>
-            <a:ext cx="10747440" cy="5034960"/>
+            <a:ext cx="10747080" cy="5034600"/>
           </a:xfrm>
           <a:prstGeom prst="rect">
             <a:avLst/>
@@ -11907,7 +11941,7 @@
         <p:spPr>
           <a:xfrm>
             <a:off x="335520" y="764640"/>
-            <a:ext cx="10747440" cy="498240"/>
+            <a:ext cx="10747080" cy="497880"/>
           </a:xfrm>
           <a:prstGeom prst="rect">
             <a:avLst/>
@@ -11963,7 +11997,7 @@
         <p:spPr>
           <a:xfrm>
             <a:off x="335520" y="764640"/>
-            <a:ext cx="10742400" cy="493200"/>
+            <a:ext cx="10742040" cy="492840"/>
           </a:xfrm>
           <a:prstGeom prst="rect">
             <a:avLst/>
@@ -12015,7 +12049,7 @@
         <p:spPr>
           <a:xfrm>
             <a:off x="335520" y="1268280"/>
-            <a:ext cx="10742400" cy="5029920"/>
+            <a:ext cx="10742040" cy="5029560"/>
           </a:xfrm>
           <a:prstGeom prst="rect">
             <a:avLst/>
@@ -12268,7 +12302,7 @@
         <p:spPr>
           <a:xfrm>
             <a:off x="335520" y="764640"/>
-            <a:ext cx="10742400" cy="493200"/>
+            <a:ext cx="10742040" cy="492840"/>
           </a:xfrm>
           <a:prstGeom prst="rect">
             <a:avLst/>
@@ -12320,7 +12354,7 @@
         <p:spPr>
           <a:xfrm>
             <a:off x="335520" y="1268280"/>
-            <a:ext cx="10742400" cy="5029920"/>
+            <a:ext cx="10742040" cy="5029560"/>
           </a:xfrm>
           <a:prstGeom prst="rect">
             <a:avLst/>
@@ -12598,7 +12632,7 @@
         <p:spPr>
           <a:xfrm>
             <a:off x="335520" y="764640"/>
-            <a:ext cx="10742400" cy="493200"/>
+            <a:ext cx="10742040" cy="492840"/>
           </a:xfrm>
           <a:prstGeom prst="rect">
             <a:avLst/>
@@ -12650,7 +12684,7 @@
         <p:spPr>
           <a:xfrm>
             <a:off x="335520" y="1268640"/>
-            <a:ext cx="10742400" cy="5029920"/>
+            <a:ext cx="10742040" cy="5029560"/>
           </a:xfrm>
           <a:prstGeom prst="rect">
             <a:avLst/>
@@ -13117,7 +13151,7 @@
         <p:spPr>
           <a:xfrm>
             <a:off x="335520" y="4406760"/>
-            <a:ext cx="10747440" cy="1356480"/>
+            <a:ext cx="10747080" cy="1356120"/>
           </a:xfrm>
           <a:prstGeom prst="rect">
             <a:avLst/>
@@ -13172,7 +13206,7 @@
         <p:spPr>
           <a:xfrm>
             <a:off x="335520" y="2906640"/>
-            <a:ext cx="10747440" cy="1494360"/>
+            <a:ext cx="10747080" cy="1494000"/>
           </a:xfrm>
           <a:prstGeom prst="rect">
             <a:avLst/>
@@ -13228,7 +13262,7 @@
         <p:spPr>
           <a:xfrm>
             <a:off x="335520" y="764640"/>
-            <a:ext cx="10747440" cy="498240"/>
+            <a:ext cx="10747080" cy="497880"/>
           </a:xfrm>
           <a:prstGeom prst="rect">
             <a:avLst/>
@@ -13287,7 +13321,7 @@
         <p:spPr>
           <a:xfrm>
             <a:off x="1656360" y="1202400"/>
-            <a:ext cx="8533800" cy="5203800"/>
+            <a:ext cx="8533440" cy="5203440"/>
           </a:xfrm>
           <a:prstGeom prst="rect">
             <a:avLst/>
@@ -13336,7 +13370,7 @@
         <p:spPr>
           <a:xfrm>
             <a:off x="335520" y="764640"/>
-            <a:ext cx="10747440" cy="498240"/>
+            <a:ext cx="10747080" cy="497880"/>
           </a:xfrm>
           <a:prstGeom prst="rect">
             <a:avLst/>
@@ -13391,7 +13425,7 @@
         <p:spPr>
           <a:xfrm>
             <a:off x="914400" y="6400800"/>
-            <a:ext cx="9139320" cy="323280"/>
+            <a:ext cx="9138960" cy="322920"/>
           </a:xfrm>
           <a:prstGeom prst="rect">
             <a:avLst/>
@@ -13460,7 +13494,7 @@
         <p:spPr>
           <a:xfrm>
             <a:off x="1035000" y="1227600"/>
-            <a:ext cx="8711640" cy="5171040"/>
+            <a:ext cx="8711280" cy="5170680"/>
           </a:xfrm>
           <a:prstGeom prst="rect">
             <a:avLst/>
@@ -13509,7 +13543,7 @@
         <p:spPr>
           <a:xfrm>
             <a:off x="335520" y="4406760"/>
-            <a:ext cx="10747440" cy="1356480"/>
+            <a:ext cx="10747080" cy="1356120"/>
           </a:xfrm>
           <a:prstGeom prst="rect">
             <a:avLst/>
@@ -13564,7 +13598,7 @@
         <p:spPr>
           <a:xfrm>
             <a:off x="335520" y="2906640"/>
-            <a:ext cx="10747440" cy="1494360"/>
+            <a:ext cx="10747080" cy="1494000"/>
           </a:xfrm>
           <a:prstGeom prst="rect">
             <a:avLst/>

</xml_diff>